<commit_message>
Updated AmTrust presentation (PPT) file
</commit_message>
<xml_diff>
--- a/RM-790-Final Presentation-Javendean Naipaul-23806137.pptx
+++ b/RM-790-Final Presentation-Javendean Naipaul-23806137.pptx
@@ -121,6 +121,14 @@
     </p:ext>
   </p:extLst>
 </p:presentation>
+</file>
+
+<file path=ppt/revisionInfo.xml><?xml version="1.0" encoding="utf-8"?>
+<p1510:revInfo xmlns:a="http://schemas.openxmlformats.org/drawingml/2006/main" xmlns:r="http://schemas.openxmlformats.org/officeDocument/2006/relationships" xmlns:p1510="http://schemas.microsoft.com/office/powerpoint/2015/10/main">
+  <p1510:revLst>
+    <p1510:client id="{86092F16-629F-01F5-1EAD-01CAD28CB080}" v="1" dt="2025-05-14T19:33:05.350"/>
+  </p1510:revLst>
+</p1510:revInfo>
 </file>
 
 <file path=ppt/charts/chart1.xml><?xml version="1.0" encoding="utf-8"?>
@@ -4861,7 +4869,7 @@
           <a:p>
             <a:fld id="{C6BEAD20-AADC-B244-BB19-189B858382B3}" type="datetimeFigureOut">
               <a:rPr lang="en-US" smtClean="0"/>
-              <a:t>5/18/2023</a:t>
+              <a:t>5/14/2025</a:t>
             </a:fld>
             <a:endParaRPr lang="en-US"/>
           </a:p>
@@ -6174,7 +6182,7 @@
           <a:p>
             <a:fld id="{5DFED3F9-E03E-1B44-8E3E-F697B3EAD655}" type="datetimeFigureOut">
               <a:rPr lang="en-US" smtClean="0"/>
-              <a:t>5/18/2023</a:t>
+              <a:t>5/14/2025</a:t>
             </a:fld>
             <a:endParaRPr lang="en-US"/>
           </a:p>
@@ -6372,7 +6380,7 @@
           <a:p>
             <a:fld id="{5DFED3F9-E03E-1B44-8E3E-F697B3EAD655}" type="datetimeFigureOut">
               <a:rPr lang="en-US" smtClean="0"/>
-              <a:t>5/18/2023</a:t>
+              <a:t>5/14/2025</a:t>
             </a:fld>
             <a:endParaRPr lang="en-US"/>
           </a:p>
@@ -6580,7 +6588,7 @@
           <a:p>
             <a:fld id="{5DFED3F9-E03E-1B44-8E3E-F697B3EAD655}" type="datetimeFigureOut">
               <a:rPr lang="en-US" smtClean="0"/>
-              <a:t>5/18/2023</a:t>
+              <a:t>5/14/2025</a:t>
             </a:fld>
             <a:endParaRPr lang="en-US"/>
           </a:p>
@@ -6778,7 +6786,7 @@
           <a:p>
             <a:fld id="{5DFED3F9-E03E-1B44-8E3E-F697B3EAD655}" type="datetimeFigureOut">
               <a:rPr lang="en-US" smtClean="0"/>
-              <a:t>5/18/2023</a:t>
+              <a:t>5/14/2025</a:t>
             </a:fld>
             <a:endParaRPr lang="en-US"/>
           </a:p>
@@ -7053,7 +7061,7 @@
           <a:p>
             <a:fld id="{5DFED3F9-E03E-1B44-8E3E-F697B3EAD655}" type="datetimeFigureOut">
               <a:rPr lang="en-US" smtClean="0"/>
-              <a:t>5/18/2023</a:t>
+              <a:t>5/14/2025</a:t>
             </a:fld>
             <a:endParaRPr lang="en-US"/>
           </a:p>
@@ -7318,7 +7326,7 @@
           <a:p>
             <a:fld id="{5DFED3F9-E03E-1B44-8E3E-F697B3EAD655}" type="datetimeFigureOut">
               <a:rPr lang="en-US" smtClean="0"/>
-              <a:t>5/18/2023</a:t>
+              <a:t>5/14/2025</a:t>
             </a:fld>
             <a:endParaRPr lang="en-US"/>
           </a:p>
@@ -7730,7 +7738,7 @@
           <a:p>
             <a:fld id="{5DFED3F9-E03E-1B44-8E3E-F697B3EAD655}" type="datetimeFigureOut">
               <a:rPr lang="en-US" smtClean="0"/>
-              <a:t>5/18/2023</a:t>
+              <a:t>5/14/2025</a:t>
             </a:fld>
             <a:endParaRPr lang="en-US"/>
           </a:p>
@@ -7871,7 +7879,7 @@
           <a:p>
             <a:fld id="{5DFED3F9-E03E-1B44-8E3E-F697B3EAD655}" type="datetimeFigureOut">
               <a:rPr lang="en-US" smtClean="0"/>
-              <a:t>5/18/2023</a:t>
+              <a:t>5/14/2025</a:t>
             </a:fld>
             <a:endParaRPr lang="en-US"/>
           </a:p>
@@ -7984,7 +7992,7 @@
           <a:p>
             <a:fld id="{5DFED3F9-E03E-1B44-8E3E-F697B3EAD655}" type="datetimeFigureOut">
               <a:rPr lang="en-US" smtClean="0"/>
-              <a:t>5/18/2023</a:t>
+              <a:t>5/14/2025</a:t>
             </a:fld>
             <a:endParaRPr lang="en-US"/>
           </a:p>
@@ -8295,7 +8303,7 @@
           <a:p>
             <a:fld id="{5DFED3F9-E03E-1B44-8E3E-F697B3EAD655}" type="datetimeFigureOut">
               <a:rPr lang="en-US" smtClean="0"/>
-              <a:t>5/18/2023</a:t>
+              <a:t>5/14/2025</a:t>
             </a:fld>
             <a:endParaRPr lang="en-US"/>
           </a:p>
@@ -8583,7 +8591,7 @@
           <a:p>
             <a:fld id="{5DFED3F9-E03E-1B44-8E3E-F697B3EAD655}" type="datetimeFigureOut">
               <a:rPr lang="en-US" smtClean="0"/>
-              <a:t>5/18/2023</a:t>
+              <a:t>5/14/2025</a:t>
             </a:fld>
             <a:endParaRPr lang="en-US"/>
           </a:p>
@@ -8824,7 +8832,7 @@
           <a:p>
             <a:fld id="{5DFED3F9-E03E-1B44-8E3E-F697B3EAD655}" type="datetimeFigureOut">
               <a:rPr lang="en-US" smtClean="0"/>
-              <a:t>5/18/2023</a:t>
+              <a:t>5/14/2025</a:t>
             </a:fld>
             <a:endParaRPr lang="en-US"/>
           </a:p>
@@ -11007,7 +11015,13 @@
                   <p:embed/>
                   <p:pic>
                     <p:nvPicPr>
-                      <p:cNvPr id="0" name=""/>
+                      <p:cNvPr id="18" name="Object 17">
+                        <a:extLst>
+                          <a:ext uri="{FF2B5EF4-FFF2-40B4-BE49-F238E27FC236}">
+                            <a16:creationId xmlns:a16="http://schemas.microsoft.com/office/drawing/2014/main" id="{2A2DF66C-4EC9-9858-AF84-8145A25C92C9}"/>
+                          </a:ext>
+                        </a:extLst>
+                      </p:cNvPr>
                       <p:cNvPicPr/>
                       <p:nvPr/>
                     </p:nvPicPr>
@@ -11185,7 +11199,13 @@
                   <p:embed/>
                   <p:pic>
                     <p:nvPicPr>
-                      <p:cNvPr id="0" name=""/>
+                      <p:cNvPr id="17" name="Object 16">
+                        <a:extLst>
+                          <a:ext uri="{FF2B5EF4-FFF2-40B4-BE49-F238E27FC236}">
+                            <a16:creationId xmlns:a16="http://schemas.microsoft.com/office/drawing/2014/main" id="{10B78124-9A08-A23B-2B65-D8E4AD7FF795}"/>
+                          </a:ext>
+                        </a:extLst>
+                      </p:cNvPr>
                       <p:cNvPicPr/>
                       <p:nvPr/>
                     </p:nvPicPr>
@@ -11377,7 +11397,7 @@
         </p:nvSpPr>
         <p:spPr>
           <a:xfrm>
-            <a:off x="3967480" y="1202452"/>
+            <a:off x="3967480" y="981873"/>
             <a:ext cx="2566670" cy="6001643"/>
           </a:xfrm>
           <a:prstGeom prst="rect">

</xml_diff>